<commit_message>
Adiciona resolucao exercicios bd 1.0 e 1.1
</commit_message>
<xml_diff>
--- a/sprint-1-bd/aulas/Aula_03_BD.pptx
+++ b/sprint-1-bd/aulas/Aula_03_BD.pptx
@@ -5,7 +5,7 @@
     <p:sldMasterId id="2147483660" r:id="rId4"/>
   </p:sldMasterIdLst>
   <p:handoutMasterIdLst>
-    <p:handoutMasterId r:id="rId19"/>
+    <p:handoutMasterId r:id="rId18"/>
   </p:handoutMasterIdLst>
   <p:sldIdLst>
     <p:sldId id="257" r:id="rId5"/>
@@ -19,9 +19,8 @@
     <p:sldId id="357" r:id="rId13"/>
     <p:sldId id="358" r:id="rId14"/>
     <p:sldId id="359" r:id="rId15"/>
-    <p:sldId id="360" r:id="rId16"/>
-    <p:sldId id="361" r:id="rId17"/>
-    <p:sldId id="259" r:id="rId18"/>
+    <p:sldId id="361" r:id="rId16"/>
+    <p:sldId id="259" r:id="rId17"/>
   </p:sldIdLst>
   <p:sldSz cx="9144000" cy="6858000" type="screen4x3"/>
   <p:notesSz cx="6858000" cy="9144000"/>
@@ -213,7 +212,7 @@
           <a:p>
             <a:fld id="{0363B5EF-C2FE-4558-B393-3D874534693D}" type="datetimeFigureOut">
               <a:rPr lang="pt-BR" smtClean="0"/>
-              <a:t>01/08/2021</a:t>
+              <a:t>02/08/2021</a:t>
             </a:fld>
             <a:endParaRPr lang="pt-BR"/>
           </a:p>
@@ -360,7 +359,7 @@
           <a:p>
             <a:fld id="{5193A530-045E-4FBC-827D-EE4599172689}" type="datetimeFigureOut">
               <a:rPr lang="pt-BR" smtClean="0"/>
-              <a:t>01/08/2021</a:t>
+              <a:t>02/08/2021</a:t>
             </a:fld>
             <a:endParaRPr lang="pt-BR"/>
           </a:p>
@@ -1302,7 +1301,7 @@
           <a:p>
             <a:fld id="{5193A530-045E-4FBC-827D-EE4599172689}" type="datetimeFigureOut">
               <a:rPr lang="pt-BR" smtClean="0"/>
-              <a:t>01/08/2021</a:t>
+              <a:t>02/08/2021</a:t>
             </a:fld>
             <a:endParaRPr lang="pt-BR"/>
           </a:p>
@@ -1532,7 +1531,7 @@
           <a:p>
             <a:fld id="{5193A530-045E-4FBC-827D-EE4599172689}" type="datetimeFigureOut">
               <a:rPr lang="pt-BR" smtClean="0"/>
-              <a:t>01/08/2021</a:t>
+              <a:t>02/08/2021</a:t>
             </a:fld>
             <a:endParaRPr lang="pt-BR"/>
           </a:p>
@@ -1772,7 +1771,7 @@
           <a:p>
             <a:fld id="{5193A530-045E-4FBC-827D-EE4599172689}" type="datetimeFigureOut">
               <a:rPr lang="pt-BR" smtClean="0"/>
-              <a:t>01/08/2021</a:t>
+              <a:t>02/08/2021</a:t>
             </a:fld>
             <a:endParaRPr lang="pt-BR"/>
           </a:p>
@@ -2010,7 +2009,7 @@
           <a:p>
             <a:fld id="{5193A530-045E-4FBC-827D-EE4599172689}" type="datetimeFigureOut">
               <a:rPr lang="pt-BR" smtClean="0"/>
-              <a:t>01/08/2021</a:t>
+              <a:t>02/08/2021</a:t>
             </a:fld>
             <a:endParaRPr lang="pt-BR"/>
           </a:p>
@@ -2211,7 +2210,7 @@
           <a:p>
             <a:fld id="{5193A530-045E-4FBC-827D-EE4599172689}" type="datetimeFigureOut">
               <a:rPr lang="pt-BR" smtClean="0"/>
-              <a:t>01/08/2021</a:t>
+              <a:t>02/08/2021</a:t>
             </a:fld>
             <a:endParaRPr lang="pt-BR"/>
           </a:p>
@@ -2484,7 +2483,7 @@
           <a:p>
             <a:fld id="{5193A530-045E-4FBC-827D-EE4599172689}" type="datetimeFigureOut">
               <a:rPr lang="pt-BR" smtClean="0"/>
-              <a:t>01/08/2021</a:t>
+              <a:t>02/08/2021</a:t>
             </a:fld>
             <a:endParaRPr lang="pt-BR"/>
           </a:p>
@@ -3177,7 +3176,7 @@
           <a:p>
             <a:fld id="{5193A530-045E-4FBC-827D-EE4599172689}" type="datetimeFigureOut">
               <a:rPr lang="pt-BR" smtClean="0"/>
-              <a:t>01/08/2021</a:t>
+              <a:t>02/08/2021</a:t>
             </a:fld>
             <a:endParaRPr lang="pt-BR"/>
           </a:p>
@@ -3604,7 +3603,7 @@
           <a:p>
             <a:fld id="{5193A530-045E-4FBC-827D-EE4599172689}" type="datetimeFigureOut">
               <a:rPr lang="pt-BR" smtClean="0"/>
-              <a:t>01/08/2021</a:t>
+              <a:t>02/08/2021</a:t>
             </a:fld>
             <a:endParaRPr lang="pt-BR"/>
           </a:p>
@@ -3782,7 +3781,7 @@
           <a:p>
             <a:fld id="{5193A530-045E-4FBC-827D-EE4599172689}" type="datetimeFigureOut">
               <a:rPr lang="pt-BR" smtClean="0"/>
-              <a:t>01/08/2021</a:t>
+              <a:t>02/08/2021</a:t>
             </a:fld>
             <a:endParaRPr lang="pt-BR"/>
           </a:p>
@@ -3937,7 +3936,7 @@
           <a:p>
             <a:fld id="{5193A530-045E-4FBC-827D-EE4599172689}" type="datetimeFigureOut">
               <a:rPr lang="pt-BR" smtClean="0"/>
-              <a:t>01/08/2021</a:t>
+              <a:t>02/08/2021</a:t>
             </a:fld>
             <a:endParaRPr lang="pt-BR"/>
           </a:p>
@@ -4274,7 +4273,7 @@
           <a:p>
             <a:fld id="{5193A530-045E-4FBC-827D-EE4599172689}" type="datetimeFigureOut">
               <a:rPr lang="pt-BR" smtClean="0"/>
-              <a:t>01/08/2021</a:t>
+              <a:t>02/08/2021</a:t>
             </a:fld>
             <a:endParaRPr lang="pt-BR"/>
           </a:p>
@@ -4526,7 +4525,7 @@
           <a:p>
             <a:fld id="{5193A530-045E-4FBC-827D-EE4599172689}" type="datetimeFigureOut">
               <a:rPr lang="pt-BR" smtClean="0"/>
-              <a:t>01/08/2021</a:t>
+              <a:t>02/08/2021</a:t>
             </a:fld>
             <a:endParaRPr lang="pt-BR"/>
           </a:p>
@@ -5274,99 +5273,6 @@
       </p:grpSpPr>
       <p:sp>
         <p:nvSpPr>
-          <p:cNvPr id="3" name="Espaço Reservado para Texto 2">
-            <a:extLst>
-              <a:ext uri="{FF2B5EF4-FFF2-40B4-BE49-F238E27FC236}">
-                <a16:creationId xmlns:a16="http://schemas.microsoft.com/office/drawing/2014/main" id="{56AFAD13-D463-4525-BF51-6A2895BEB621}"/>
-              </a:ext>
-            </a:extLst>
-          </p:cNvPr>
-          <p:cNvSpPr>
-            <a:spLocks noGrp="1"/>
-          </p:cNvSpPr>
-          <p:nvPr>
-            <p:ph type="body" sz="quarter" idx="13"/>
-          </p:nvPr>
-        </p:nvSpPr>
-        <p:spPr/>
-        <p:txBody>
-          <a:bodyPr>
-            <a:normAutofit lnSpcReduction="10000"/>
-          </a:bodyPr>
-          <a:lstStyle/>
-          <a:p>
-            <a:r>
-              <a:rPr lang="pt-BR" dirty="0"/>
-              <a:t>Representação gráfica</a:t>
-            </a:r>
-          </a:p>
-          <a:p>
-            <a:endParaRPr lang="pt-BR" dirty="0"/>
-          </a:p>
-        </p:txBody>
-      </p:sp>
-      <p:pic>
-        <p:nvPicPr>
-          <p:cNvPr id="5" name="Imagem 4">
-            <a:extLst>
-              <a:ext uri="{FF2B5EF4-FFF2-40B4-BE49-F238E27FC236}">
-                <a16:creationId xmlns:a16="http://schemas.microsoft.com/office/drawing/2014/main" id="{F185F7AF-3A91-49B8-8262-09F0FC074E2B}"/>
-              </a:ext>
-            </a:extLst>
-          </p:cNvPr>
-          <p:cNvPicPr>
-            <a:picLocks noChangeAspect="1"/>
-          </p:cNvPicPr>
-          <p:nvPr/>
-        </p:nvPicPr>
-        <p:blipFill>
-          <a:blip r:embed="rId2"/>
-          <a:stretch>
-            <a:fillRect/>
-          </a:stretch>
-        </p:blipFill>
-        <p:spPr>
-          <a:xfrm>
-            <a:off x="628099" y="2652604"/>
-            <a:ext cx="7887801" cy="1552792"/>
-          </a:xfrm>
-          <a:prstGeom prst="rect">
-            <a:avLst/>
-          </a:prstGeom>
-        </p:spPr>
-      </p:pic>
-    </p:spTree>
-    <p:extLst>
-      <p:ext uri="{BB962C8B-B14F-4D97-AF65-F5344CB8AC3E}">
-        <p14:creationId xmlns:p14="http://schemas.microsoft.com/office/powerpoint/2010/main" val="3207024342"/>
-      </p:ext>
-    </p:extLst>
-  </p:cSld>
-  <p:clrMapOvr>
-    <a:masterClrMapping/>
-  </p:clrMapOvr>
-</p:sld>
-</file>
-
-<file path=ppt/slides/slide13.xml><?xml version="1.0" encoding="utf-8"?>
-<p:sld xmlns:a="http://schemas.openxmlformats.org/drawingml/2006/main" xmlns:r="http://schemas.openxmlformats.org/officeDocument/2006/relationships" xmlns:p="http://schemas.openxmlformats.org/presentationml/2006/main">
-  <p:cSld>
-    <p:spTree>
-      <p:nvGrpSpPr>
-        <p:cNvPr id="1" name=""/>
-        <p:cNvGrpSpPr/>
-        <p:nvPr/>
-      </p:nvGrpSpPr>
-      <p:grpSpPr>
-        <a:xfrm>
-          <a:off x="0" y="0"/>
-          <a:ext cx="0" cy="0"/>
-          <a:chOff x="0" y="0"/>
-          <a:chExt cx="0" cy="0"/>
-        </a:xfrm>
-      </p:grpSpPr>
-      <p:sp>
-        <p:nvSpPr>
           <p:cNvPr id="2" name="Espaço Reservado para Conteúdo 1">
             <a:extLst>
               <a:ext uri="{FF2B5EF4-FFF2-40B4-BE49-F238E27FC236}">
@@ -5461,7 +5367,7 @@
 </p:sld>
 </file>
 
-<file path=ppt/slides/slide14.xml><?xml version="1.0" encoding="utf-8"?>
+<file path=ppt/slides/slide13.xml><?xml version="1.0" encoding="utf-8"?>
 <p:sld xmlns:a="http://schemas.openxmlformats.org/drawingml/2006/main" xmlns:r="http://schemas.openxmlformats.org/officeDocument/2006/relationships" xmlns:p="http://schemas.openxmlformats.org/presentationml/2006/main">
   <p:cSld>
     <p:bg>
@@ -7118,6 +7024,15 @@
 </file>
 
 <file path=customXml/item2.xml><?xml version="1.0" encoding="utf-8"?>
+<?mso-contentType ?>
+<FormTemplates xmlns="http://schemas.microsoft.com/sharepoint/v3/contenttype/forms">
+  <Display>DocumentLibraryForm</Display>
+  <Edit>DocumentLibraryForm</Edit>
+  <New>DocumentLibraryForm</New>
+</FormTemplates>
+</file>
+
+<file path=customXml/item3.xml><?xml version="1.0" encoding="utf-8"?>
 <ct:contentTypeSchema xmlns:ct="http://schemas.microsoft.com/office/2006/metadata/contentType" xmlns:ma="http://schemas.microsoft.com/office/2006/metadata/properties/metaAttributes" ct:_="" ma:_="" ma:contentTypeName="Documento" ma:contentTypeID="0x0101001C0BDCB75C490F449996D271113E7085" ma:contentTypeVersion="12" ma:contentTypeDescription="Crie um novo documento." ma:contentTypeScope="" ma:versionID="f78031fe7deaa61be8293be56c3571d3">
   <xsd:schema xmlns:xsd="http://www.w3.org/2001/XMLSchema" xmlns:xs="http://www.w3.org/2001/XMLSchema" xmlns:p="http://schemas.microsoft.com/office/2006/metadata/properties" xmlns:ns2="56135199-fddc-46f9-8522-4d2f2df906d6" xmlns:ns3="616ddcb6-37a4-4b68-9e62-eadd2126515b" targetNamespace="http://schemas.microsoft.com/office/2006/metadata/properties" ma:root="true" ma:fieldsID="84b82f449ed318020166b0b852c53661" ns2:_="" ns3:_="">
     <xsd:import namespace="56135199-fddc-46f9-8522-4d2f2df906d6"/>
@@ -7334,15 +7249,6 @@
 </ct:contentTypeSchema>
 </file>
 
-<file path=customXml/item3.xml><?xml version="1.0" encoding="utf-8"?>
-<?mso-contentType ?>
-<FormTemplates xmlns="http://schemas.microsoft.com/sharepoint/v3/contenttype/forms">
-  <Display>DocumentLibraryForm</Display>
-  <Edit>DocumentLibraryForm</Edit>
-  <New>DocumentLibraryForm</New>
-</FormTemplates>
-</file>
-
 <file path=customXml/itemProps1.xml><?xml version="1.0" encoding="utf-8"?>
 <ds:datastoreItem xmlns:ds="http://schemas.openxmlformats.org/officeDocument/2006/customXml" ds:itemID="{7598036D-8F24-4150-8883-4040B39D685E}">
   <ds:schemaRefs>
@@ -7353,6 +7259,14 @@
 </file>
 
 <file path=customXml/itemProps2.xml><?xml version="1.0" encoding="utf-8"?>
+<ds:datastoreItem xmlns:ds="http://schemas.openxmlformats.org/officeDocument/2006/customXml" ds:itemID="{8AEFDE86-9ABD-4B53-9EB0-611E0710241D}">
+  <ds:schemaRefs>
+    <ds:schemaRef ds:uri="http://schemas.microsoft.com/sharepoint/v3/contenttype/forms"/>
+  </ds:schemaRefs>
+</ds:datastoreItem>
+</file>
+
+<file path=customXml/itemProps3.xml><?xml version="1.0" encoding="utf-8"?>
 <ds:datastoreItem xmlns:ds="http://schemas.openxmlformats.org/officeDocument/2006/customXml" ds:itemID="{DD46F767-487D-45A7-9383-4F9F29521278}">
   <ds:schemaRefs>
     <ds:schemaRef ds:uri="http://schemas.microsoft.com/office/2006/metadata/contentType"/>
@@ -7369,12 +7283,4 @@
     <ds:schemaRef ds:uri="http://schemas.microsoft.com/internal/obd"/>
   </ds:schemaRefs>
 </ds:datastoreItem>
-</file>
-
-<file path=customXml/itemProps3.xml><?xml version="1.0" encoding="utf-8"?>
-<ds:datastoreItem xmlns:ds="http://schemas.openxmlformats.org/officeDocument/2006/customXml" ds:itemID="{8AEFDE86-9ABD-4B53-9EB0-611E0710241D}">
-  <ds:schemaRefs>
-    <ds:schemaRef ds:uri="http://schemas.microsoft.com/sharepoint/v3/contenttype/forms"/>
-  </ds:schemaRefs>
-</ds:datastoreItem>
 </file>
</xml_diff>

<commit_message>
Ajusta apresentacao aula 03 bd
</commit_message>
<xml_diff>
--- a/sprint-1-bd/aulas/Aula_03_BD.pptx
+++ b/sprint-1-bd/aulas/Aula_03_BD.pptx
@@ -5881,7 +5881,21 @@
                 <a:latin typeface="Montserrat" panose="00000500000000000000"/>
                 <a:cs typeface="Arial" panose="020B0604020202020204" pitchFamily="34" charset="0"/>
               </a:rPr>
-              <a:t> é um conjunto de informações sobre uma </a:t>
+              <a:t> é um conjunto </a:t>
+            </a:r>
+            <a:r>
+              <a:rPr lang="pt-BR" sz="2400">
+                <a:latin typeface="Montserrat" panose="00000500000000000000"/>
+                <a:cs typeface="Arial" panose="020B0604020202020204" pitchFamily="34" charset="0"/>
+              </a:rPr>
+              <a:t>de dados </a:t>
+            </a:r>
+            <a:r>
+              <a:rPr lang="pt-BR" sz="2400" dirty="0">
+                <a:latin typeface="Montserrat" panose="00000500000000000000"/>
+                <a:cs typeface="Arial" panose="020B0604020202020204" pitchFamily="34" charset="0"/>
+              </a:rPr>
+              <a:t>sobre uma </a:t>
             </a:r>
             <a:r>
               <a:rPr lang="pt-BR" sz="2400" b="1" dirty="0">
@@ -7018,18 +7032,18 @@
 </file>
 
 <file path=customXml/item1.xml><?xml version="1.0" encoding="utf-8"?>
-<p:properties xmlns:p="http://schemas.microsoft.com/office/2006/metadata/properties" xmlns:xsi="http://www.w3.org/2001/XMLSchema-instance" xmlns:pc="http://schemas.microsoft.com/office/infopath/2007/PartnerControls">
-  <documentManagement/>
-</p:properties>
-</file>
-
-<file path=customXml/item2.xml><?xml version="1.0" encoding="utf-8"?>
 <?mso-contentType ?>
 <FormTemplates xmlns="http://schemas.microsoft.com/sharepoint/v3/contenttype/forms">
   <Display>DocumentLibraryForm</Display>
   <Edit>DocumentLibraryForm</Edit>
   <New>DocumentLibraryForm</New>
 </FormTemplates>
+</file>
+
+<file path=customXml/item2.xml><?xml version="1.0" encoding="utf-8"?>
+<p:properties xmlns:p="http://schemas.microsoft.com/office/2006/metadata/properties" xmlns:xsi="http://www.w3.org/2001/XMLSchema-instance" xmlns:pc="http://schemas.microsoft.com/office/infopath/2007/PartnerControls">
+  <documentManagement/>
+</p:properties>
 </file>
 
 <file path=customXml/item3.xml><?xml version="1.0" encoding="utf-8"?>
@@ -7250,18 +7264,18 @@
 </file>
 
 <file path=customXml/itemProps1.xml><?xml version="1.0" encoding="utf-8"?>
-<ds:datastoreItem xmlns:ds="http://schemas.openxmlformats.org/officeDocument/2006/customXml" ds:itemID="{7598036D-8F24-4150-8883-4040B39D685E}">
+<ds:datastoreItem xmlns:ds="http://schemas.openxmlformats.org/officeDocument/2006/customXml" ds:itemID="{8AEFDE86-9ABD-4B53-9EB0-611E0710241D}">
   <ds:schemaRefs>
-    <ds:schemaRef ds:uri="http://schemas.microsoft.com/office/2006/metadata/properties"/>
-    <ds:schemaRef ds:uri="http://schemas.microsoft.com/office/infopath/2007/PartnerControls"/>
+    <ds:schemaRef ds:uri="http://schemas.microsoft.com/sharepoint/v3/contenttype/forms"/>
   </ds:schemaRefs>
 </ds:datastoreItem>
 </file>
 
 <file path=customXml/itemProps2.xml><?xml version="1.0" encoding="utf-8"?>
-<ds:datastoreItem xmlns:ds="http://schemas.openxmlformats.org/officeDocument/2006/customXml" ds:itemID="{8AEFDE86-9ABD-4B53-9EB0-611E0710241D}">
+<ds:datastoreItem xmlns:ds="http://schemas.openxmlformats.org/officeDocument/2006/customXml" ds:itemID="{7598036D-8F24-4150-8883-4040B39D685E}">
   <ds:schemaRefs>
-    <ds:schemaRef ds:uri="http://schemas.microsoft.com/sharepoint/v3/contenttype/forms"/>
+    <ds:schemaRef ds:uri="http://schemas.microsoft.com/office/2006/metadata/properties"/>
+    <ds:schemaRef ds:uri="http://schemas.microsoft.com/office/infopath/2007/PartnerControls"/>
   </ds:schemaRefs>
 </ds:datastoreItem>
 </file>

</xml_diff>